<commit_message>
replaced ball with wall
</commit_message>
<xml_diff>
--- a/baby-experiment/design/design_main.pptx
+++ b/baby-experiment/design/design_main.pptx
@@ -9,9 +9,16 @@
     <p:sldId id="292" r:id="rId3"/>
     <p:sldId id="291" r:id="rId4"/>
     <p:sldId id="287" r:id="rId5"/>
-    <p:sldId id="290" r:id="rId6"/>
-    <p:sldId id="288" r:id="rId7"/>
-    <p:sldId id="289" r:id="rId8"/>
+    <p:sldId id="293" r:id="rId6"/>
+    <p:sldId id="298" r:id="rId7"/>
+    <p:sldId id="297" r:id="rId8"/>
+    <p:sldId id="294" r:id="rId9"/>
+    <p:sldId id="300" r:id="rId10"/>
+    <p:sldId id="301" r:id="rId11"/>
+    <p:sldId id="302" r:id="rId12"/>
+    <p:sldId id="290" r:id="rId13"/>
+    <p:sldId id="288" r:id="rId14"/>
+    <p:sldId id="289" r:id="rId15"/>
   </p:sldIdLst>
   <p:sldSz cx="12192000" cy="6858000"/>
   <p:notesSz cx="6858000" cy="9144000"/>
@@ -6579,6 +6586,741 @@
 </p:sld>
 </file>
 
+<file path=ppt/slides/slide10.xml><?xml version="1.0" encoding="utf-8"?>
+<p:sld xmlns:a="http://schemas.openxmlformats.org/drawingml/2006/main" xmlns:r="http://schemas.openxmlformats.org/officeDocument/2006/relationships" xmlns:p="http://schemas.openxmlformats.org/presentationml/2006/main">
+  <p:cSld>
+    <p:spTree>
+      <p:nvGrpSpPr>
+        <p:cNvPr id="1" name=""/>
+        <p:cNvGrpSpPr/>
+        <p:nvPr/>
+      </p:nvGrpSpPr>
+      <p:grpSpPr>
+        <a:xfrm>
+          <a:off x="0" y="0"/>
+          <a:ext cx="0" cy="0"/>
+          <a:chOff x="0" y="0"/>
+          <a:chExt cx="0" cy="0"/>
+        </a:xfrm>
+      </p:grpSpPr>
+      <p:pic>
+        <p:nvPicPr>
+          <p:cNvPr id="18" name="Picture 17" descr="A picture containing text&#10;&#10;Description automatically generated">
+            <a:extLst>
+              <a:ext uri="{FF2B5EF4-FFF2-40B4-BE49-F238E27FC236}">
+                <a16:creationId xmlns:a16="http://schemas.microsoft.com/office/drawing/2014/main" id="{94578D29-70AC-C948-BA7F-69991F353187}"/>
+              </a:ext>
+            </a:extLst>
+          </p:cNvPr>
+          <p:cNvPicPr>
+            <a:picLocks noChangeAspect="1"/>
+          </p:cNvPicPr>
+          <p:nvPr/>
+        </p:nvPicPr>
+        <p:blipFill rotWithShape="1">
+          <a:blip r:embed="rId2"/>
+          <a:srcRect l="4697" t="20140" r="4719" b="19957"/>
+          <a:stretch/>
+        </p:blipFill>
+        <p:spPr>
+          <a:xfrm>
+            <a:off x="340355" y="2517568"/>
+            <a:ext cx="3326681" cy="2199903"/>
+          </a:xfrm>
+          <a:prstGeom prst="rect">
+            <a:avLst/>
+          </a:prstGeom>
+        </p:spPr>
+      </p:pic>
+      <p:pic>
+        <p:nvPicPr>
+          <p:cNvPr id="6" name="Picture 5" descr="A picture containing text&#10;&#10;Description automatically generated">
+            <a:extLst>
+              <a:ext uri="{FF2B5EF4-FFF2-40B4-BE49-F238E27FC236}">
+                <a16:creationId xmlns:a16="http://schemas.microsoft.com/office/drawing/2014/main" id="{41569761-AEA6-7D44-BED4-C9349FFA1D6C}"/>
+              </a:ext>
+            </a:extLst>
+          </p:cNvPr>
+          <p:cNvPicPr>
+            <a:picLocks noChangeAspect="1"/>
+          </p:cNvPicPr>
+          <p:nvPr/>
+        </p:nvPicPr>
+        <p:blipFill rotWithShape="1">
+          <a:blip r:embed="rId2"/>
+          <a:srcRect l="4697" t="20140" r="4719" b="19957"/>
+          <a:stretch/>
+        </p:blipFill>
+        <p:spPr>
+          <a:xfrm>
+            <a:off x="8524964" y="2517567"/>
+            <a:ext cx="3326681" cy="2199903"/>
+          </a:xfrm>
+          <a:prstGeom prst="rect">
+            <a:avLst/>
+          </a:prstGeom>
+        </p:spPr>
+      </p:pic>
+      <p:pic>
+        <p:nvPicPr>
+          <p:cNvPr id="7" name="Picture 6" descr="A picture containing text&#10;&#10;Description automatically generated">
+            <a:extLst>
+              <a:ext uri="{FF2B5EF4-FFF2-40B4-BE49-F238E27FC236}">
+                <a16:creationId xmlns:a16="http://schemas.microsoft.com/office/drawing/2014/main" id="{929A2FA3-3E54-5B46-A09C-1F9FD464AE1B}"/>
+              </a:ext>
+            </a:extLst>
+          </p:cNvPr>
+          <p:cNvPicPr>
+            <a:picLocks noChangeAspect="1"/>
+          </p:cNvPicPr>
+          <p:nvPr/>
+        </p:nvPicPr>
+        <p:blipFill rotWithShape="1">
+          <a:blip r:embed="rId2">
+            <a:duotone>
+              <a:schemeClr val="accent4">
+                <a:shade val="45000"/>
+                <a:satMod val="135000"/>
+              </a:schemeClr>
+              <a:prstClr val="white"/>
+            </a:duotone>
+          </a:blip>
+          <a:srcRect l="4697" t="20140" r="4719" b="19957"/>
+          <a:stretch/>
+        </p:blipFill>
+        <p:spPr>
+          <a:xfrm>
+            <a:off x="4432659" y="2517567"/>
+            <a:ext cx="3326682" cy="2199904"/>
+          </a:xfrm>
+          <a:prstGeom prst="rect">
+            <a:avLst/>
+          </a:prstGeom>
+        </p:spPr>
+      </p:pic>
+      <p:pic>
+        <p:nvPicPr>
+          <p:cNvPr id="5" name="Picture 4" descr="A picture containing text&#10;&#10;Description automatically generated">
+            <a:extLst>
+              <a:ext uri="{FF2B5EF4-FFF2-40B4-BE49-F238E27FC236}">
+                <a16:creationId xmlns:a16="http://schemas.microsoft.com/office/drawing/2014/main" id="{A2AAB69D-92E0-8342-8C98-2DDB3B622CD9}"/>
+              </a:ext>
+            </a:extLst>
+          </p:cNvPr>
+          <p:cNvPicPr>
+            <a:picLocks noChangeAspect="1"/>
+          </p:cNvPicPr>
+          <p:nvPr/>
+        </p:nvPicPr>
+        <p:blipFill rotWithShape="1">
+          <a:blip r:embed="rId2"/>
+          <a:srcRect l="4697" t="20140" r="4719" b="19957"/>
+          <a:stretch/>
+        </p:blipFill>
+        <p:spPr>
+          <a:xfrm>
+            <a:off x="4432660" y="2517566"/>
+            <a:ext cx="3326681" cy="2199903"/>
+          </a:xfrm>
+          <a:prstGeom prst="rect">
+            <a:avLst/>
+          </a:prstGeom>
+        </p:spPr>
+      </p:pic>
+    </p:spTree>
+    <p:extLst>
+      <p:ext uri="{BB962C8B-B14F-4D97-AF65-F5344CB8AC3E}">
+        <p14:creationId xmlns:p14="http://schemas.microsoft.com/office/powerpoint/2010/main" val="3954579506"/>
+      </p:ext>
+    </p:extLst>
+  </p:cSld>
+  <p:clrMapOvr>
+    <a:masterClrMapping/>
+  </p:clrMapOvr>
+  <p:timing>
+    <p:tnLst>
+      <p:par>
+        <p:cTn id="1" dur="indefinite" restart="never" nodeType="tmRoot">
+          <p:childTnLst>
+            <p:seq concurrent="1" nextAc="seek">
+              <p:cTn id="2" dur="indefinite" nodeType="mainSeq">
+                <p:childTnLst>
+                  <p:par>
+                    <p:cTn id="3" fill="hold">
+                      <p:stCondLst>
+                        <p:cond delay="indefinite"/>
+                        <p:cond evt="onBegin" delay="0">
+                          <p:tn val="2"/>
+                        </p:cond>
+                      </p:stCondLst>
+                      <p:childTnLst>
+                        <p:par>
+                          <p:cTn id="4" fill="hold">
+                            <p:stCondLst>
+                              <p:cond delay="0"/>
+                            </p:stCondLst>
+                            <p:childTnLst>
+                              <p:par>
+                                <p:cTn id="5" presetID="1" presetClass="exit" presetSubtype="0" fill="hold" nodeType="afterEffect">
+                                  <p:stCondLst>
+                                    <p:cond delay="1000"/>
+                                  </p:stCondLst>
+                                  <p:childTnLst>
+                                    <p:set>
+                                      <p:cBhvr>
+                                        <p:cTn id="6" dur="1" fill="hold">
+                                          <p:stCondLst>
+                                            <p:cond delay="0"/>
+                                          </p:stCondLst>
+                                        </p:cTn>
+                                        <p:tgtEl>
+                                          <p:spTgt spid="5"/>
+                                        </p:tgtEl>
+                                        <p:attrNameLst>
+                                          <p:attrName>style.visibility</p:attrName>
+                                        </p:attrNameLst>
+                                      </p:cBhvr>
+                                      <p:to>
+                                        <p:strVal val="hidden"/>
+                                      </p:to>
+                                    </p:set>
+                                  </p:childTnLst>
+                                </p:cTn>
+                              </p:par>
+                            </p:childTnLst>
+                          </p:cTn>
+                        </p:par>
+                        <p:par>
+                          <p:cTn id="7" fill="hold">
+                            <p:stCondLst>
+                              <p:cond delay="1000"/>
+                            </p:stCondLst>
+                            <p:childTnLst>
+                              <p:par>
+                                <p:cTn id="8" presetID="1" presetClass="exit" presetSubtype="0" fill="hold" nodeType="afterEffect">
+                                  <p:stCondLst>
+                                    <p:cond delay="700"/>
+                                  </p:stCondLst>
+                                  <p:childTnLst>
+                                    <p:set>
+                                      <p:cBhvr>
+                                        <p:cTn id="9" dur="1" fill="hold">
+                                          <p:stCondLst>
+                                            <p:cond delay="0"/>
+                                          </p:stCondLst>
+                                        </p:cTn>
+                                        <p:tgtEl>
+                                          <p:spTgt spid="7"/>
+                                        </p:tgtEl>
+                                        <p:attrNameLst>
+                                          <p:attrName>style.visibility</p:attrName>
+                                        </p:attrNameLst>
+                                      </p:cBhvr>
+                                      <p:to>
+                                        <p:strVal val="hidden"/>
+                                      </p:to>
+                                    </p:set>
+                                  </p:childTnLst>
+                                </p:cTn>
+                              </p:par>
+                            </p:childTnLst>
+                          </p:cTn>
+                        </p:par>
+                      </p:childTnLst>
+                    </p:cTn>
+                  </p:par>
+                </p:childTnLst>
+              </p:cTn>
+              <p:prevCondLst>
+                <p:cond evt="onPrev" delay="0">
+                  <p:tgtEl>
+                    <p:sldTgt/>
+                  </p:tgtEl>
+                </p:cond>
+              </p:prevCondLst>
+              <p:nextCondLst>
+                <p:cond evt="onNext" delay="0">
+                  <p:tgtEl>
+                    <p:sldTgt/>
+                  </p:tgtEl>
+                </p:cond>
+              </p:nextCondLst>
+            </p:seq>
+          </p:childTnLst>
+        </p:cTn>
+      </p:par>
+    </p:tnLst>
+  </p:timing>
+</p:sld>
+</file>
+
+<file path=ppt/slides/slide11.xml><?xml version="1.0" encoding="utf-8"?>
+<p:sld xmlns:a="http://schemas.openxmlformats.org/drawingml/2006/main" xmlns:r="http://schemas.openxmlformats.org/officeDocument/2006/relationships" xmlns:p="http://schemas.openxmlformats.org/presentationml/2006/main">
+  <p:cSld>
+    <p:spTree>
+      <p:nvGrpSpPr>
+        <p:cNvPr id="1" name=""/>
+        <p:cNvGrpSpPr/>
+        <p:nvPr/>
+      </p:nvGrpSpPr>
+      <p:grpSpPr>
+        <a:xfrm>
+          <a:off x="0" y="0"/>
+          <a:ext cx="0" cy="0"/>
+          <a:chOff x="0" y="0"/>
+          <a:chExt cx="0" cy="0"/>
+        </a:xfrm>
+      </p:grpSpPr>
+      <p:pic>
+        <p:nvPicPr>
+          <p:cNvPr id="18" name="Picture 17" descr="A picture containing text&#10;&#10;Description automatically generated">
+            <a:extLst>
+              <a:ext uri="{FF2B5EF4-FFF2-40B4-BE49-F238E27FC236}">
+                <a16:creationId xmlns:a16="http://schemas.microsoft.com/office/drawing/2014/main" id="{94578D29-70AC-C948-BA7F-69991F353187}"/>
+              </a:ext>
+            </a:extLst>
+          </p:cNvPr>
+          <p:cNvPicPr>
+            <a:picLocks noChangeAspect="1"/>
+          </p:cNvPicPr>
+          <p:nvPr/>
+        </p:nvPicPr>
+        <p:blipFill rotWithShape="1">
+          <a:blip r:embed="rId2"/>
+          <a:srcRect l="4697" t="20140" r="4719" b="19957"/>
+          <a:stretch/>
+        </p:blipFill>
+        <p:spPr>
+          <a:xfrm>
+            <a:off x="340355" y="2517568"/>
+            <a:ext cx="3326681" cy="2199903"/>
+          </a:xfrm>
+          <a:prstGeom prst="rect">
+            <a:avLst/>
+          </a:prstGeom>
+        </p:spPr>
+      </p:pic>
+      <p:pic>
+        <p:nvPicPr>
+          <p:cNvPr id="30" name="Picture 29" descr="A picture containing text&#10;&#10;Description automatically generated">
+            <a:extLst>
+              <a:ext uri="{FF2B5EF4-FFF2-40B4-BE49-F238E27FC236}">
+                <a16:creationId xmlns:a16="http://schemas.microsoft.com/office/drawing/2014/main" id="{9845375B-239E-4749-8BD5-654F6B6B4EF4}"/>
+              </a:ext>
+            </a:extLst>
+          </p:cNvPr>
+          <p:cNvPicPr>
+            <a:picLocks noChangeAspect="1"/>
+          </p:cNvPicPr>
+          <p:nvPr/>
+        </p:nvPicPr>
+        <p:blipFill rotWithShape="1">
+          <a:blip r:embed="rId2">
+            <a:duotone>
+              <a:schemeClr val="accent4">
+                <a:shade val="45000"/>
+                <a:satMod val="135000"/>
+              </a:schemeClr>
+              <a:prstClr val="white"/>
+            </a:duotone>
+          </a:blip>
+          <a:srcRect l="4697" t="20140" r="4719" b="19957"/>
+          <a:stretch/>
+        </p:blipFill>
+        <p:spPr>
+          <a:xfrm>
+            <a:off x="8524966" y="2517567"/>
+            <a:ext cx="3326682" cy="2199904"/>
+          </a:xfrm>
+          <a:prstGeom prst="rect">
+            <a:avLst/>
+          </a:prstGeom>
+        </p:spPr>
+      </p:pic>
+      <p:pic>
+        <p:nvPicPr>
+          <p:cNvPr id="6" name="Picture 5" descr="A picture containing text&#10;&#10;Description automatically generated">
+            <a:extLst>
+              <a:ext uri="{FF2B5EF4-FFF2-40B4-BE49-F238E27FC236}">
+                <a16:creationId xmlns:a16="http://schemas.microsoft.com/office/drawing/2014/main" id="{41569761-AEA6-7D44-BED4-C9349FFA1D6C}"/>
+              </a:ext>
+            </a:extLst>
+          </p:cNvPr>
+          <p:cNvPicPr>
+            <a:picLocks noChangeAspect="1"/>
+          </p:cNvPicPr>
+          <p:nvPr/>
+        </p:nvPicPr>
+        <p:blipFill rotWithShape="1">
+          <a:blip r:embed="rId2"/>
+          <a:srcRect l="4697" t="20140" r="4719" b="19957"/>
+          <a:stretch/>
+        </p:blipFill>
+        <p:spPr>
+          <a:xfrm>
+            <a:off x="4432660" y="2517568"/>
+            <a:ext cx="3326681" cy="2199903"/>
+          </a:xfrm>
+          <a:prstGeom prst="rect">
+            <a:avLst/>
+          </a:prstGeom>
+        </p:spPr>
+      </p:pic>
+      <p:pic>
+        <p:nvPicPr>
+          <p:cNvPr id="5" name="Picture 4" descr="A picture containing text&#10;&#10;Description automatically generated">
+            <a:extLst>
+              <a:ext uri="{FF2B5EF4-FFF2-40B4-BE49-F238E27FC236}">
+                <a16:creationId xmlns:a16="http://schemas.microsoft.com/office/drawing/2014/main" id="{332447CB-8096-8144-9875-BB3287FEA88B}"/>
+              </a:ext>
+            </a:extLst>
+          </p:cNvPr>
+          <p:cNvPicPr>
+            <a:picLocks noChangeAspect="1"/>
+          </p:cNvPicPr>
+          <p:nvPr/>
+        </p:nvPicPr>
+        <p:blipFill rotWithShape="1">
+          <a:blip r:embed="rId2"/>
+          <a:srcRect l="4697" t="20140" r="4719" b="19957"/>
+          <a:stretch/>
+        </p:blipFill>
+        <p:spPr>
+          <a:xfrm>
+            <a:off x="8524964" y="2517567"/>
+            <a:ext cx="3326681" cy="2199903"/>
+          </a:xfrm>
+          <a:prstGeom prst="rect">
+            <a:avLst/>
+          </a:prstGeom>
+        </p:spPr>
+      </p:pic>
+    </p:spTree>
+    <p:extLst>
+      <p:ext uri="{BB962C8B-B14F-4D97-AF65-F5344CB8AC3E}">
+        <p14:creationId xmlns:p14="http://schemas.microsoft.com/office/powerpoint/2010/main" val="173881997"/>
+      </p:ext>
+    </p:extLst>
+  </p:cSld>
+  <p:clrMapOvr>
+    <a:masterClrMapping/>
+  </p:clrMapOvr>
+  <p:timing>
+    <p:tnLst>
+      <p:par>
+        <p:cTn id="1" dur="indefinite" restart="never" nodeType="tmRoot">
+          <p:childTnLst>
+            <p:seq concurrent="1" nextAc="seek">
+              <p:cTn id="2" dur="indefinite" nodeType="mainSeq">
+                <p:childTnLst>
+                  <p:par>
+                    <p:cTn id="3" fill="hold">
+                      <p:stCondLst>
+                        <p:cond delay="indefinite"/>
+                        <p:cond evt="onBegin" delay="0">
+                          <p:tn val="2"/>
+                        </p:cond>
+                      </p:stCondLst>
+                      <p:childTnLst>
+                        <p:par>
+                          <p:cTn id="4" fill="hold">
+                            <p:stCondLst>
+                              <p:cond delay="0"/>
+                            </p:stCondLst>
+                            <p:childTnLst>
+                              <p:par>
+                                <p:cTn id="5" presetID="1" presetClass="exit" presetSubtype="0" fill="hold" nodeType="afterEffect">
+                                  <p:stCondLst>
+                                    <p:cond delay="1000"/>
+                                  </p:stCondLst>
+                                  <p:childTnLst>
+                                    <p:set>
+                                      <p:cBhvr>
+                                        <p:cTn id="6" dur="1" fill="hold">
+                                          <p:stCondLst>
+                                            <p:cond delay="0"/>
+                                          </p:stCondLst>
+                                        </p:cTn>
+                                        <p:tgtEl>
+                                          <p:spTgt spid="5"/>
+                                        </p:tgtEl>
+                                        <p:attrNameLst>
+                                          <p:attrName>style.visibility</p:attrName>
+                                        </p:attrNameLst>
+                                      </p:cBhvr>
+                                      <p:to>
+                                        <p:strVal val="hidden"/>
+                                      </p:to>
+                                    </p:set>
+                                  </p:childTnLst>
+                                </p:cTn>
+                              </p:par>
+                            </p:childTnLst>
+                          </p:cTn>
+                        </p:par>
+                      </p:childTnLst>
+                    </p:cTn>
+                  </p:par>
+                  <p:par>
+                    <p:cTn id="7" fill="hold">
+                      <p:stCondLst>
+                        <p:cond delay="indefinite"/>
+                      </p:stCondLst>
+                      <p:childTnLst>
+                        <p:par>
+                          <p:cTn id="8" fill="hold">
+                            <p:stCondLst>
+                              <p:cond delay="0"/>
+                            </p:stCondLst>
+                            <p:childTnLst>
+                              <p:par>
+                                <p:cTn id="9" presetID="1" presetClass="exit" presetSubtype="0" fill="hold" nodeType="clickEffect">
+                                  <p:stCondLst>
+                                    <p:cond delay="0"/>
+                                  </p:stCondLst>
+                                  <p:childTnLst>
+                                    <p:set>
+                                      <p:cBhvr>
+                                        <p:cTn id="10" dur="1" fill="hold">
+                                          <p:stCondLst>
+                                            <p:cond delay="0"/>
+                                          </p:stCondLst>
+                                        </p:cTn>
+                                        <p:tgtEl>
+                                          <p:spTgt spid="30"/>
+                                        </p:tgtEl>
+                                        <p:attrNameLst>
+                                          <p:attrName>style.visibility</p:attrName>
+                                        </p:attrNameLst>
+                                      </p:cBhvr>
+                                      <p:to>
+                                        <p:strVal val="hidden"/>
+                                      </p:to>
+                                    </p:set>
+                                  </p:childTnLst>
+                                </p:cTn>
+                              </p:par>
+                            </p:childTnLst>
+                          </p:cTn>
+                        </p:par>
+                      </p:childTnLst>
+                    </p:cTn>
+                  </p:par>
+                </p:childTnLst>
+              </p:cTn>
+              <p:prevCondLst>
+                <p:cond evt="onPrev" delay="0">
+                  <p:tgtEl>
+                    <p:sldTgt/>
+                  </p:tgtEl>
+                </p:cond>
+              </p:prevCondLst>
+              <p:nextCondLst>
+                <p:cond evt="onNext" delay="0">
+                  <p:tgtEl>
+                    <p:sldTgt/>
+                  </p:tgtEl>
+                </p:cond>
+              </p:nextCondLst>
+            </p:seq>
+          </p:childTnLst>
+        </p:cTn>
+      </p:par>
+    </p:tnLst>
+  </p:timing>
+</p:sld>
+</file>
+
+<file path=ppt/slides/slide12.xml><?xml version="1.0" encoding="utf-8"?>
+<p:sld xmlns:a="http://schemas.openxmlformats.org/drawingml/2006/main" xmlns:r="http://schemas.openxmlformats.org/officeDocument/2006/relationships" xmlns:p="http://schemas.openxmlformats.org/presentationml/2006/main">
+  <p:cSld>
+    <p:spTree>
+      <p:nvGrpSpPr>
+        <p:cNvPr id="1" name=""/>
+        <p:cNvGrpSpPr/>
+        <p:nvPr/>
+      </p:nvGrpSpPr>
+      <p:grpSpPr>
+        <a:xfrm>
+          <a:off x="0" y="0"/>
+          <a:ext cx="0" cy="0"/>
+          <a:chOff x="0" y="0"/>
+          <a:chExt cx="0" cy="0"/>
+        </a:xfrm>
+      </p:grpSpPr>
+    </p:spTree>
+    <p:extLst>
+      <p:ext uri="{BB962C8B-B14F-4D97-AF65-F5344CB8AC3E}">
+        <p14:creationId xmlns:p14="http://schemas.microsoft.com/office/powerpoint/2010/main" val="3006665327"/>
+      </p:ext>
+    </p:extLst>
+  </p:cSld>
+  <p:clrMapOvr>
+    <a:masterClrMapping/>
+  </p:clrMapOvr>
+</p:sld>
+</file>
+
+<file path=ppt/slides/slide13.xml><?xml version="1.0" encoding="utf-8"?>
+<p:sld xmlns:a="http://schemas.openxmlformats.org/drawingml/2006/main" xmlns:r="http://schemas.openxmlformats.org/officeDocument/2006/relationships" xmlns:p="http://schemas.openxmlformats.org/presentationml/2006/main">
+  <p:cSld>
+    <p:spTree>
+      <p:nvGrpSpPr>
+        <p:cNvPr id="1" name=""/>
+        <p:cNvGrpSpPr/>
+        <p:nvPr/>
+      </p:nvGrpSpPr>
+      <p:grpSpPr>
+        <a:xfrm>
+          <a:off x="0" y="0"/>
+          <a:ext cx="0" cy="0"/>
+          <a:chOff x="0" y="0"/>
+          <a:chExt cx="0" cy="0"/>
+        </a:xfrm>
+      </p:grpSpPr>
+      <p:sp>
+        <p:nvSpPr>
+          <p:cNvPr id="2" name="Title 1">
+            <a:extLst>
+              <a:ext uri="{FF2B5EF4-FFF2-40B4-BE49-F238E27FC236}">
+                <a16:creationId xmlns:a16="http://schemas.microsoft.com/office/drawing/2014/main" id="{B077ED55-DBC7-134A-BF9C-DC0D6965EA7B}"/>
+              </a:ext>
+            </a:extLst>
+          </p:cNvPr>
+          <p:cNvSpPr>
+            <a:spLocks noGrp="1"/>
+          </p:cNvSpPr>
+          <p:nvPr>
+            <p:ph type="title"/>
+          </p:nvPr>
+        </p:nvSpPr>
+        <p:spPr/>
+        <p:txBody>
+          <a:bodyPr/>
+          <a:lstStyle/>
+          <a:p>
+            <a:endParaRPr lang="en-US"/>
+          </a:p>
+        </p:txBody>
+      </p:sp>
+      <p:sp>
+        <p:nvSpPr>
+          <p:cNvPr id="3" name="Content Placeholder 2">
+            <a:extLst>
+              <a:ext uri="{FF2B5EF4-FFF2-40B4-BE49-F238E27FC236}">
+                <a16:creationId xmlns:a16="http://schemas.microsoft.com/office/drawing/2014/main" id="{7D5A610D-29D8-BE41-8B83-1EA472766B64}"/>
+              </a:ext>
+            </a:extLst>
+          </p:cNvPr>
+          <p:cNvSpPr>
+            <a:spLocks noGrp="1"/>
+          </p:cNvSpPr>
+          <p:nvPr>
+            <p:ph idx="1"/>
+          </p:nvPr>
+        </p:nvSpPr>
+        <p:spPr/>
+        <p:txBody>
+          <a:bodyPr/>
+          <a:lstStyle/>
+          <a:p>
+            <a:endParaRPr lang="en-US"/>
+          </a:p>
+        </p:txBody>
+      </p:sp>
+    </p:spTree>
+    <p:extLst>
+      <p:ext uri="{BB962C8B-B14F-4D97-AF65-F5344CB8AC3E}">
+        <p14:creationId xmlns:p14="http://schemas.microsoft.com/office/powerpoint/2010/main" val="1143467939"/>
+      </p:ext>
+    </p:extLst>
+  </p:cSld>
+  <p:clrMapOvr>
+    <a:masterClrMapping/>
+  </p:clrMapOvr>
+</p:sld>
+</file>
+
+<file path=ppt/slides/slide14.xml><?xml version="1.0" encoding="utf-8"?>
+<p:sld xmlns:a="http://schemas.openxmlformats.org/drawingml/2006/main" xmlns:r="http://schemas.openxmlformats.org/officeDocument/2006/relationships" xmlns:p="http://schemas.openxmlformats.org/presentationml/2006/main">
+  <p:cSld>
+    <p:spTree>
+      <p:nvGrpSpPr>
+        <p:cNvPr id="1" name=""/>
+        <p:cNvGrpSpPr/>
+        <p:nvPr/>
+      </p:nvGrpSpPr>
+      <p:grpSpPr>
+        <a:xfrm>
+          <a:off x="0" y="0"/>
+          <a:ext cx="0" cy="0"/>
+          <a:chOff x="0" y="0"/>
+          <a:chExt cx="0" cy="0"/>
+        </a:xfrm>
+      </p:grpSpPr>
+      <p:sp>
+        <p:nvSpPr>
+          <p:cNvPr id="2" name="Title 1">
+            <a:extLst>
+              <a:ext uri="{FF2B5EF4-FFF2-40B4-BE49-F238E27FC236}">
+                <a16:creationId xmlns:a16="http://schemas.microsoft.com/office/drawing/2014/main" id="{18DBD84A-CD5F-464D-B7BC-9388C65C6022}"/>
+              </a:ext>
+            </a:extLst>
+          </p:cNvPr>
+          <p:cNvSpPr>
+            <a:spLocks noGrp="1"/>
+          </p:cNvSpPr>
+          <p:nvPr>
+            <p:ph type="title"/>
+          </p:nvPr>
+        </p:nvSpPr>
+        <p:spPr/>
+        <p:txBody>
+          <a:bodyPr/>
+          <a:lstStyle/>
+          <a:p>
+            <a:endParaRPr lang="en-US"/>
+          </a:p>
+        </p:txBody>
+      </p:sp>
+      <p:sp>
+        <p:nvSpPr>
+          <p:cNvPr id="3" name="Content Placeholder 2">
+            <a:extLst>
+              <a:ext uri="{FF2B5EF4-FFF2-40B4-BE49-F238E27FC236}">
+                <a16:creationId xmlns:a16="http://schemas.microsoft.com/office/drawing/2014/main" id="{8B5B401C-F7E9-C644-BE96-12D9504793D3}"/>
+              </a:ext>
+            </a:extLst>
+          </p:cNvPr>
+          <p:cNvSpPr>
+            <a:spLocks noGrp="1"/>
+          </p:cNvSpPr>
+          <p:nvPr>
+            <p:ph idx="1"/>
+          </p:nvPr>
+        </p:nvSpPr>
+        <p:spPr/>
+        <p:txBody>
+          <a:bodyPr/>
+          <a:lstStyle/>
+          <a:p>
+            <a:endParaRPr lang="en-US"/>
+          </a:p>
+        </p:txBody>
+      </p:sp>
+    </p:spTree>
+    <p:extLst>
+      <p:ext uri="{BB962C8B-B14F-4D97-AF65-F5344CB8AC3E}">
+        <p14:creationId xmlns:p14="http://schemas.microsoft.com/office/powerpoint/2010/main" val="674693450"/>
+      </p:ext>
+    </p:extLst>
+  </p:cSld>
+  <p:clrMapOvr>
+    <a:masterClrMapping/>
+  </p:clrMapOvr>
+</p:sld>
+</file>
+
 <file path=ppt/slides/slide2.xml><?xml version="1.0" encoding="utf-8"?>
 <p:sld xmlns:a="http://schemas.openxmlformats.org/drawingml/2006/main" xmlns:r="http://schemas.openxmlformats.org/officeDocument/2006/relationships" xmlns:p="http://schemas.openxmlformats.org/presentationml/2006/main">
   <p:cSld>
@@ -8223,24 +8965,16 @@
                             </p:stCondLst>
                             <p:childTnLst>
                               <p:par>
-                                <p:cTn id="12" presetID="9" presetClass="exit" presetSubtype="0" fill="hold" nodeType="clickEffect">
+                                <p:cTn id="12" presetID="1" presetClass="exit" presetSubtype="0" fill="hold" nodeType="clickEffect">
                                   <p:stCondLst>
                                     <p:cond delay="0"/>
                                   </p:stCondLst>
                                   <p:childTnLst>
-                                    <p:animEffect transition="out" filter="dissolve">
-                                      <p:cBhvr>
-                                        <p:cTn id="13" dur="500"/>
-                                        <p:tgtEl>
-                                          <p:spTgt spid="12"/>
-                                        </p:tgtEl>
-                                      </p:cBhvr>
-                                    </p:animEffect>
                                     <p:set>
                                       <p:cBhvr>
-                                        <p:cTn id="14" dur="1" fill="hold">
+                                        <p:cTn id="13" dur="1" fill="hold">
                                           <p:stCondLst>
-                                            <p:cond delay="499"/>
+                                            <p:cond delay="0"/>
                                           </p:stCondLst>
                                         </p:cTn>
                                         <p:tgtEl>
@@ -8258,14 +8992,14 @@
                                 </p:cTn>
                               </p:par>
                               <p:par>
-                                <p:cTn id="15" presetID="1" presetClass="entr" presetSubtype="0" fill="hold" nodeType="withEffect">
+                                <p:cTn id="14" presetID="1" presetClass="entr" presetSubtype="0" fill="hold" nodeType="withEffect">
                                   <p:stCondLst>
                                     <p:cond delay="0"/>
                                   </p:stCondLst>
                                   <p:childTnLst>
                                     <p:set>
                                       <p:cBhvr>
-                                        <p:cTn id="16" dur="1" fill="hold">
+                                        <p:cTn id="15" dur="1" fill="hold">
                                           <p:stCondLst>
                                             <p:cond delay="0"/>
                                           </p:stCondLst>
@@ -8332,16 +9066,288 @@
           <a:chExt cx="0" cy="0"/>
         </a:xfrm>
       </p:grpSpPr>
+      <p:pic>
+        <p:nvPicPr>
+          <p:cNvPr id="18" name="Picture 17" descr="A picture containing text&#10;&#10;Description automatically generated">
+            <a:extLst>
+              <a:ext uri="{FF2B5EF4-FFF2-40B4-BE49-F238E27FC236}">
+                <a16:creationId xmlns:a16="http://schemas.microsoft.com/office/drawing/2014/main" id="{94578D29-70AC-C948-BA7F-69991F353187}"/>
+              </a:ext>
+            </a:extLst>
+          </p:cNvPr>
+          <p:cNvPicPr>
+            <a:picLocks noChangeAspect="1"/>
+          </p:cNvPicPr>
+          <p:nvPr/>
+        </p:nvPicPr>
+        <p:blipFill rotWithShape="1">
+          <a:blip r:embed="rId2"/>
+          <a:srcRect l="4697" t="20140" r="4719" b="19957"/>
+          <a:stretch/>
+        </p:blipFill>
+        <p:spPr>
+          <a:xfrm>
+            <a:off x="1170253" y="2152402"/>
+            <a:ext cx="3860927" cy="2553195"/>
+          </a:xfrm>
+          <a:prstGeom prst="rect">
+            <a:avLst/>
+          </a:prstGeom>
+        </p:spPr>
+      </p:pic>
+      <p:pic>
+        <p:nvPicPr>
+          <p:cNvPr id="22" name="Picture 21">
+            <a:extLst>
+              <a:ext uri="{FF2B5EF4-FFF2-40B4-BE49-F238E27FC236}">
+                <a16:creationId xmlns:a16="http://schemas.microsoft.com/office/drawing/2014/main" id="{4C6D9BBF-9026-DB4A-A8A2-90C4E06F550D}"/>
+              </a:ext>
+            </a:extLst>
+          </p:cNvPr>
+          <p:cNvPicPr>
+            <a:picLocks noChangeAspect="1"/>
+          </p:cNvPicPr>
+          <p:nvPr/>
+        </p:nvPicPr>
+        <p:blipFill>
+          <a:blip r:embed="rId3"/>
+          <a:stretch>
+            <a:fillRect/>
+          </a:stretch>
+        </p:blipFill>
+        <p:spPr>
+          <a:xfrm>
+            <a:off x="8134596" y="2253819"/>
+            <a:ext cx="1949568" cy="1949568"/>
+          </a:xfrm>
+          <a:prstGeom prst="rect">
+            <a:avLst/>
+          </a:prstGeom>
+        </p:spPr>
+      </p:pic>
+      <p:pic>
+        <p:nvPicPr>
+          <p:cNvPr id="30" name="Picture 29" descr="A picture containing text&#10;&#10;Description automatically generated">
+            <a:extLst>
+              <a:ext uri="{FF2B5EF4-FFF2-40B4-BE49-F238E27FC236}">
+                <a16:creationId xmlns:a16="http://schemas.microsoft.com/office/drawing/2014/main" id="{9845375B-239E-4749-8BD5-654F6B6B4EF4}"/>
+              </a:ext>
+            </a:extLst>
+          </p:cNvPr>
+          <p:cNvPicPr>
+            <a:picLocks noChangeAspect="1"/>
+          </p:cNvPicPr>
+          <p:nvPr/>
+        </p:nvPicPr>
+        <p:blipFill rotWithShape="1">
+          <a:blip r:embed="rId2">
+            <a:duotone>
+              <a:schemeClr val="accent4">
+                <a:shade val="45000"/>
+                <a:satMod val="135000"/>
+              </a:schemeClr>
+              <a:prstClr val="white"/>
+            </a:duotone>
+          </a:blip>
+          <a:srcRect l="4697" t="20140" r="4719" b="19957"/>
+          <a:stretch/>
+        </p:blipFill>
+        <p:spPr>
+          <a:xfrm>
+            <a:off x="6978732" y="2152402"/>
+            <a:ext cx="3860927" cy="2553195"/>
+          </a:xfrm>
+          <a:prstGeom prst="rect">
+            <a:avLst/>
+          </a:prstGeom>
+        </p:spPr>
+      </p:pic>
+      <p:pic>
+        <p:nvPicPr>
+          <p:cNvPr id="26" name="Picture 25" descr="A picture containing text&#10;&#10;Description automatically generated">
+            <a:extLst>
+              <a:ext uri="{FF2B5EF4-FFF2-40B4-BE49-F238E27FC236}">
+                <a16:creationId xmlns:a16="http://schemas.microsoft.com/office/drawing/2014/main" id="{6F32703E-8B6F-0A47-96D0-12175DBE6E2C}"/>
+              </a:ext>
+            </a:extLst>
+          </p:cNvPr>
+          <p:cNvPicPr>
+            <a:picLocks noChangeAspect="1"/>
+          </p:cNvPicPr>
+          <p:nvPr/>
+        </p:nvPicPr>
+        <p:blipFill rotWithShape="1">
+          <a:blip r:embed="rId2"/>
+          <a:srcRect l="4697" t="20140" r="4719" b="19957"/>
+          <a:stretch/>
+        </p:blipFill>
+        <p:spPr>
+          <a:xfrm>
+            <a:off x="6990606" y="2152402"/>
+            <a:ext cx="3860927" cy="2553195"/>
+          </a:xfrm>
+          <a:prstGeom prst="rect">
+            <a:avLst/>
+          </a:prstGeom>
+        </p:spPr>
+      </p:pic>
     </p:spTree>
     <p:extLst>
       <p:ext uri="{BB962C8B-B14F-4D97-AF65-F5344CB8AC3E}">
-        <p14:creationId xmlns:p14="http://schemas.microsoft.com/office/powerpoint/2010/main" val="3006665327"/>
+        <p14:creationId xmlns:p14="http://schemas.microsoft.com/office/powerpoint/2010/main" val="2518601104"/>
       </p:ext>
     </p:extLst>
   </p:cSld>
   <p:clrMapOvr>
     <a:masterClrMapping/>
   </p:clrMapOvr>
+  <p:timing>
+    <p:tnLst>
+      <p:par>
+        <p:cTn id="1" dur="indefinite" restart="never" nodeType="tmRoot">
+          <p:childTnLst>
+            <p:seq concurrent="1" nextAc="seek">
+              <p:cTn id="2" dur="indefinite" nodeType="mainSeq">
+                <p:childTnLst>
+                  <p:par>
+                    <p:cTn id="3" fill="hold">
+                      <p:stCondLst>
+                        <p:cond delay="indefinite"/>
+                      </p:stCondLst>
+                      <p:childTnLst>
+                        <p:par>
+                          <p:cTn id="4" fill="hold">
+                            <p:stCondLst>
+                              <p:cond delay="0"/>
+                            </p:stCondLst>
+                            <p:childTnLst>
+                              <p:par>
+                                <p:cTn id="5" presetID="1" presetClass="exit" presetSubtype="0" fill="hold" nodeType="clickEffect">
+                                  <p:stCondLst>
+                                    <p:cond delay="0"/>
+                                  </p:stCondLst>
+                                  <p:childTnLst>
+                                    <p:set>
+                                      <p:cBhvr>
+                                        <p:cTn id="6" dur="1" fill="hold">
+                                          <p:stCondLst>
+                                            <p:cond delay="0"/>
+                                          </p:stCondLst>
+                                        </p:cTn>
+                                        <p:tgtEl>
+                                          <p:spTgt spid="26"/>
+                                        </p:tgtEl>
+                                        <p:attrNameLst>
+                                          <p:attrName>style.visibility</p:attrName>
+                                        </p:attrNameLst>
+                                      </p:cBhvr>
+                                      <p:to>
+                                        <p:strVal val="hidden"/>
+                                      </p:to>
+                                    </p:set>
+                                  </p:childTnLst>
+                                </p:cTn>
+                              </p:par>
+                            </p:childTnLst>
+                          </p:cTn>
+                        </p:par>
+                        <p:par>
+                          <p:cTn id="7" fill="hold">
+                            <p:stCondLst>
+                              <p:cond delay="0"/>
+                            </p:stCondLst>
+                            <p:childTnLst>
+                              <p:par>
+                                <p:cTn id="8" presetID="1" presetClass="exit" presetSubtype="0" fill="hold" nodeType="afterEffect">
+                                  <p:stCondLst>
+                                    <p:cond delay="500"/>
+                                  </p:stCondLst>
+                                  <p:childTnLst>
+                                    <p:set>
+                                      <p:cBhvr>
+                                        <p:cTn id="9" dur="1" fill="hold">
+                                          <p:stCondLst>
+                                            <p:cond delay="0"/>
+                                          </p:stCondLst>
+                                        </p:cTn>
+                                        <p:tgtEl>
+                                          <p:spTgt spid="30"/>
+                                        </p:tgtEl>
+                                        <p:attrNameLst>
+                                          <p:attrName>style.visibility</p:attrName>
+                                        </p:attrNameLst>
+                                      </p:cBhvr>
+                                      <p:to>
+                                        <p:strVal val="hidden"/>
+                                      </p:to>
+                                    </p:set>
+                                  </p:childTnLst>
+                                </p:cTn>
+                              </p:par>
+                            </p:childTnLst>
+                          </p:cTn>
+                        </p:par>
+                        <p:par>
+                          <p:cTn id="10" fill="hold">
+                            <p:stCondLst>
+                              <p:cond delay="500"/>
+                            </p:stCondLst>
+                            <p:childTnLst>
+                              <p:par>
+                                <p:cTn id="11" presetID="1" presetClass="entr" presetSubtype="0" fill="hold" nodeType="afterEffect">
+                                  <p:stCondLst>
+                                    <p:cond delay="0"/>
+                                  </p:stCondLst>
+                                  <p:childTnLst>
+                                    <p:set>
+                                      <p:cBhvr>
+                                        <p:cTn id="12" dur="1" fill="hold">
+                                          <p:stCondLst>
+                                            <p:cond delay="0"/>
+                                          </p:stCondLst>
+                                        </p:cTn>
+                                        <p:tgtEl>
+                                          <p:spTgt spid="22"/>
+                                        </p:tgtEl>
+                                        <p:attrNameLst>
+                                          <p:attrName>style.visibility</p:attrName>
+                                        </p:attrNameLst>
+                                      </p:cBhvr>
+                                      <p:to>
+                                        <p:strVal val="visible"/>
+                                      </p:to>
+                                    </p:set>
+                                  </p:childTnLst>
+                                </p:cTn>
+                              </p:par>
+                            </p:childTnLst>
+                          </p:cTn>
+                        </p:par>
+                      </p:childTnLst>
+                    </p:cTn>
+                  </p:par>
+                </p:childTnLst>
+              </p:cTn>
+              <p:prevCondLst>
+                <p:cond evt="onPrev" delay="0">
+                  <p:tgtEl>
+                    <p:sldTgt/>
+                  </p:tgtEl>
+                </p:cond>
+              </p:prevCondLst>
+              <p:nextCondLst>
+                <p:cond evt="onNext" delay="0">
+                  <p:tgtEl>
+                    <p:sldTgt/>
+                  </p:tgtEl>
+                </p:cond>
+              </p:nextCondLst>
+            </p:seq>
+          </p:childTnLst>
+        </p:cTn>
+      </p:par>
+    </p:tnLst>
+  </p:timing>
 </p:sld>
 </file>
 
@@ -8362,66 +9368,189 @@
           <a:chExt cx="0" cy="0"/>
         </a:xfrm>
       </p:grpSpPr>
-      <p:sp>
-        <p:nvSpPr>
-          <p:cNvPr id="2" name="Title 1">
-            <a:extLst>
-              <a:ext uri="{FF2B5EF4-FFF2-40B4-BE49-F238E27FC236}">
-                <a16:creationId xmlns:a16="http://schemas.microsoft.com/office/drawing/2014/main" id="{B077ED55-DBC7-134A-BF9C-DC0D6965EA7B}"/>
-              </a:ext>
-            </a:extLst>
-          </p:cNvPr>
-          <p:cNvSpPr>
-            <a:spLocks noGrp="1"/>
-          </p:cNvSpPr>
-          <p:nvPr>
-            <p:ph type="title"/>
-          </p:nvPr>
-        </p:nvSpPr>
-        <p:spPr/>
-        <p:txBody>
-          <a:bodyPr/>
-          <a:lstStyle/>
-          <a:p>
-            <a:endParaRPr lang="en-US"/>
-          </a:p>
-        </p:txBody>
-      </p:sp>
-      <p:sp>
-        <p:nvSpPr>
-          <p:cNvPr id="3" name="Content Placeholder 2">
-            <a:extLst>
-              <a:ext uri="{FF2B5EF4-FFF2-40B4-BE49-F238E27FC236}">
-                <a16:creationId xmlns:a16="http://schemas.microsoft.com/office/drawing/2014/main" id="{7D5A610D-29D8-BE41-8B83-1EA472766B64}"/>
-              </a:ext>
-            </a:extLst>
-          </p:cNvPr>
-          <p:cNvSpPr>
-            <a:spLocks noGrp="1"/>
-          </p:cNvSpPr>
-          <p:nvPr>
-            <p:ph idx="1"/>
-          </p:nvPr>
-        </p:nvSpPr>
-        <p:spPr/>
-        <p:txBody>
-          <a:bodyPr/>
-          <a:lstStyle/>
-          <a:p>
-            <a:endParaRPr lang="en-US"/>
-          </a:p>
-        </p:txBody>
-      </p:sp>
+      <p:pic>
+        <p:nvPicPr>
+          <p:cNvPr id="18" name="Picture 17" descr="A picture containing text&#10;&#10;Description automatically generated">
+            <a:extLst>
+              <a:ext uri="{FF2B5EF4-FFF2-40B4-BE49-F238E27FC236}">
+                <a16:creationId xmlns:a16="http://schemas.microsoft.com/office/drawing/2014/main" id="{94578D29-70AC-C948-BA7F-69991F353187}"/>
+              </a:ext>
+            </a:extLst>
+          </p:cNvPr>
+          <p:cNvPicPr>
+            <a:picLocks noChangeAspect="1"/>
+          </p:cNvPicPr>
+          <p:nvPr/>
+        </p:nvPicPr>
+        <p:blipFill rotWithShape="1">
+          <a:blip r:embed="rId2"/>
+          <a:srcRect l="4697" t="20140" r="4719" b="19957"/>
+          <a:stretch/>
+        </p:blipFill>
+        <p:spPr>
+          <a:xfrm>
+            <a:off x="4432659" y="2517567"/>
+            <a:ext cx="3326681" cy="2199903"/>
+          </a:xfrm>
+          <a:prstGeom prst="rect">
+            <a:avLst/>
+          </a:prstGeom>
+        </p:spPr>
+      </p:pic>
+      <p:pic>
+        <p:nvPicPr>
+          <p:cNvPr id="6" name="Picture 5" descr="A picture containing text&#10;&#10;Description automatically generated">
+            <a:extLst>
+              <a:ext uri="{FF2B5EF4-FFF2-40B4-BE49-F238E27FC236}">
+                <a16:creationId xmlns:a16="http://schemas.microsoft.com/office/drawing/2014/main" id="{41569761-AEA6-7D44-BED4-C9349FFA1D6C}"/>
+              </a:ext>
+            </a:extLst>
+          </p:cNvPr>
+          <p:cNvPicPr>
+            <a:picLocks noChangeAspect="1"/>
+          </p:cNvPicPr>
+          <p:nvPr/>
+        </p:nvPicPr>
+        <p:blipFill rotWithShape="1">
+          <a:blip r:embed="rId2"/>
+          <a:srcRect l="4697" t="20140" r="4719" b="19957"/>
+          <a:stretch/>
+        </p:blipFill>
+        <p:spPr>
+          <a:xfrm>
+            <a:off x="8524964" y="2517567"/>
+            <a:ext cx="3326681" cy="2199903"/>
+          </a:xfrm>
+          <a:prstGeom prst="rect">
+            <a:avLst/>
+          </a:prstGeom>
+        </p:spPr>
+      </p:pic>
+      <p:pic>
+        <p:nvPicPr>
+          <p:cNvPr id="13" name="Picture 12" descr="A picture containing text&#10;&#10;Description automatically generated">
+            <a:extLst>
+              <a:ext uri="{FF2B5EF4-FFF2-40B4-BE49-F238E27FC236}">
+                <a16:creationId xmlns:a16="http://schemas.microsoft.com/office/drawing/2014/main" id="{EABC9385-C1F7-964D-BA69-0D4C18CD2695}"/>
+              </a:ext>
+            </a:extLst>
+          </p:cNvPr>
+          <p:cNvPicPr>
+            <a:picLocks noChangeAspect="1"/>
+          </p:cNvPicPr>
+          <p:nvPr/>
+        </p:nvPicPr>
+        <p:blipFill rotWithShape="1">
+          <a:blip r:embed="rId2">
+            <a:duotone>
+              <a:schemeClr val="accent4">
+                <a:shade val="45000"/>
+                <a:satMod val="135000"/>
+              </a:schemeClr>
+              <a:prstClr val="white"/>
+            </a:duotone>
+          </a:blip>
+          <a:srcRect l="4697" t="20140" r="4719" b="19957"/>
+          <a:stretch/>
+        </p:blipFill>
+        <p:spPr>
+          <a:xfrm>
+            <a:off x="340355" y="2517566"/>
+            <a:ext cx="3326682" cy="2199904"/>
+          </a:xfrm>
+          <a:prstGeom prst="rect">
+            <a:avLst/>
+          </a:prstGeom>
+        </p:spPr>
+      </p:pic>
     </p:spTree>
     <p:extLst>
       <p:ext uri="{BB962C8B-B14F-4D97-AF65-F5344CB8AC3E}">
-        <p14:creationId xmlns:p14="http://schemas.microsoft.com/office/powerpoint/2010/main" val="1143467939"/>
+        <p14:creationId xmlns:p14="http://schemas.microsoft.com/office/powerpoint/2010/main" val="587096478"/>
       </p:ext>
     </p:extLst>
   </p:cSld>
   <p:clrMapOvr>
     <a:masterClrMapping/>
   </p:clrMapOvr>
+  <p:timing>
+    <p:tnLst>
+      <p:par>
+        <p:cTn id="1" dur="indefinite" restart="never" nodeType="tmRoot">
+          <p:childTnLst>
+            <p:seq concurrent="1" nextAc="seek">
+              <p:cTn id="2" dur="indefinite" nodeType="mainSeq">
+                <p:childTnLst>
+                  <p:par>
+                    <p:cTn id="3" fill="hold">
+                      <p:stCondLst>
+                        <p:cond delay="indefinite"/>
+                        <p:cond evt="onBegin" delay="0">
+                          <p:tn val="2"/>
+                        </p:cond>
+                      </p:stCondLst>
+                      <p:childTnLst>
+                        <p:par>
+                          <p:cTn id="4" fill="hold">
+                            <p:stCondLst>
+                              <p:cond delay="0"/>
+                            </p:stCondLst>
+                            <p:childTnLst>
+                              <p:par>
+                                <p:cTn id="5" presetID="1" presetClass="exit" presetSubtype="0" fill="hold" nodeType="afterEffect">
+                                  <p:stCondLst>
+                                    <p:cond delay="700"/>
+                                  </p:stCondLst>
+                                  <p:childTnLst>
+                                    <p:set>
+                                      <p:cBhvr>
+                                        <p:cTn id="6" dur="1" fill="hold">
+                                          <p:stCondLst>
+                                            <p:cond delay="0"/>
+                                          </p:stCondLst>
+                                        </p:cTn>
+                                        <p:tgtEl>
+                                          <p:spTgt spid="13"/>
+                                        </p:tgtEl>
+                                        <p:attrNameLst>
+                                          <p:attrName>style.visibility</p:attrName>
+                                        </p:attrNameLst>
+                                      </p:cBhvr>
+                                      <p:to>
+                                        <p:strVal val="hidden"/>
+                                      </p:to>
+                                    </p:set>
+                                  </p:childTnLst>
+                                </p:cTn>
+                              </p:par>
+                            </p:childTnLst>
+                          </p:cTn>
+                        </p:par>
+                      </p:childTnLst>
+                    </p:cTn>
+                  </p:par>
+                </p:childTnLst>
+              </p:cTn>
+              <p:prevCondLst>
+                <p:cond evt="onPrev" delay="0">
+                  <p:tgtEl>
+                    <p:sldTgt/>
+                  </p:tgtEl>
+                </p:cond>
+              </p:prevCondLst>
+              <p:nextCondLst>
+                <p:cond evt="onNext" delay="0">
+                  <p:tgtEl>
+                    <p:sldTgt/>
+                  </p:tgtEl>
+                </p:cond>
+              </p:nextCondLst>
+            </p:seq>
+          </p:childTnLst>
+        </p:cTn>
+      </p:par>
+    </p:tnLst>
+  </p:timing>
 </p:sld>
 </file>
 
@@ -8442,66 +9571,666 @@
           <a:chExt cx="0" cy="0"/>
         </a:xfrm>
       </p:grpSpPr>
-      <p:sp>
-        <p:nvSpPr>
-          <p:cNvPr id="2" name="Title 1">
-            <a:extLst>
-              <a:ext uri="{FF2B5EF4-FFF2-40B4-BE49-F238E27FC236}">
-                <a16:creationId xmlns:a16="http://schemas.microsoft.com/office/drawing/2014/main" id="{18DBD84A-CD5F-464D-B7BC-9388C65C6022}"/>
-              </a:ext>
-            </a:extLst>
-          </p:cNvPr>
-          <p:cNvSpPr>
-            <a:spLocks noGrp="1"/>
-          </p:cNvSpPr>
-          <p:nvPr>
-            <p:ph type="title"/>
-          </p:nvPr>
-        </p:nvSpPr>
-        <p:spPr/>
-        <p:txBody>
-          <a:bodyPr/>
-          <a:lstStyle/>
-          <a:p>
-            <a:endParaRPr lang="en-US"/>
-          </a:p>
-        </p:txBody>
-      </p:sp>
-      <p:sp>
-        <p:nvSpPr>
-          <p:cNvPr id="3" name="Content Placeholder 2">
-            <a:extLst>
-              <a:ext uri="{FF2B5EF4-FFF2-40B4-BE49-F238E27FC236}">
-                <a16:creationId xmlns:a16="http://schemas.microsoft.com/office/drawing/2014/main" id="{8B5B401C-F7E9-C644-BE96-12D9504793D3}"/>
-              </a:ext>
-            </a:extLst>
-          </p:cNvPr>
-          <p:cNvSpPr>
-            <a:spLocks noGrp="1"/>
-          </p:cNvSpPr>
-          <p:nvPr>
-            <p:ph idx="1"/>
-          </p:nvPr>
-        </p:nvSpPr>
-        <p:spPr/>
-        <p:txBody>
-          <a:bodyPr/>
-          <a:lstStyle/>
-          <a:p>
-            <a:endParaRPr lang="en-US"/>
-          </a:p>
-        </p:txBody>
-      </p:sp>
+      <p:pic>
+        <p:nvPicPr>
+          <p:cNvPr id="18" name="Picture 17" descr="A picture containing text&#10;&#10;Description automatically generated">
+            <a:extLst>
+              <a:ext uri="{FF2B5EF4-FFF2-40B4-BE49-F238E27FC236}">
+                <a16:creationId xmlns:a16="http://schemas.microsoft.com/office/drawing/2014/main" id="{94578D29-70AC-C948-BA7F-69991F353187}"/>
+              </a:ext>
+            </a:extLst>
+          </p:cNvPr>
+          <p:cNvPicPr>
+            <a:picLocks noChangeAspect="1"/>
+          </p:cNvPicPr>
+          <p:nvPr/>
+        </p:nvPicPr>
+        <p:blipFill rotWithShape="1">
+          <a:blip r:embed="rId2"/>
+          <a:srcRect l="4697" t="20140" r="4719" b="19957"/>
+          <a:stretch/>
+        </p:blipFill>
+        <p:spPr>
+          <a:xfrm>
+            <a:off x="340355" y="2517568"/>
+            <a:ext cx="3326681" cy="2199903"/>
+          </a:xfrm>
+          <a:prstGeom prst="rect">
+            <a:avLst/>
+          </a:prstGeom>
+        </p:spPr>
+      </p:pic>
+      <p:pic>
+        <p:nvPicPr>
+          <p:cNvPr id="6" name="Picture 5" descr="A picture containing text&#10;&#10;Description automatically generated">
+            <a:extLst>
+              <a:ext uri="{FF2B5EF4-FFF2-40B4-BE49-F238E27FC236}">
+                <a16:creationId xmlns:a16="http://schemas.microsoft.com/office/drawing/2014/main" id="{41569761-AEA6-7D44-BED4-C9349FFA1D6C}"/>
+              </a:ext>
+            </a:extLst>
+          </p:cNvPr>
+          <p:cNvPicPr>
+            <a:picLocks noChangeAspect="1"/>
+          </p:cNvPicPr>
+          <p:nvPr/>
+        </p:nvPicPr>
+        <p:blipFill rotWithShape="1">
+          <a:blip r:embed="rId2"/>
+          <a:srcRect l="4697" t="20140" r="4719" b="19957"/>
+          <a:stretch/>
+        </p:blipFill>
+        <p:spPr>
+          <a:xfrm>
+            <a:off x="8524964" y="2517567"/>
+            <a:ext cx="3326681" cy="2199903"/>
+          </a:xfrm>
+          <a:prstGeom prst="rect">
+            <a:avLst/>
+          </a:prstGeom>
+        </p:spPr>
+      </p:pic>
+      <p:pic>
+        <p:nvPicPr>
+          <p:cNvPr id="7" name="Picture 6" descr="A picture containing text&#10;&#10;Description automatically generated">
+            <a:extLst>
+              <a:ext uri="{FF2B5EF4-FFF2-40B4-BE49-F238E27FC236}">
+                <a16:creationId xmlns:a16="http://schemas.microsoft.com/office/drawing/2014/main" id="{929A2FA3-3E54-5B46-A09C-1F9FD464AE1B}"/>
+              </a:ext>
+            </a:extLst>
+          </p:cNvPr>
+          <p:cNvPicPr>
+            <a:picLocks noChangeAspect="1"/>
+          </p:cNvPicPr>
+          <p:nvPr/>
+        </p:nvPicPr>
+        <p:blipFill rotWithShape="1">
+          <a:blip r:embed="rId2">
+            <a:duotone>
+              <a:schemeClr val="accent4">
+                <a:shade val="45000"/>
+                <a:satMod val="135000"/>
+              </a:schemeClr>
+              <a:prstClr val="white"/>
+            </a:duotone>
+          </a:blip>
+          <a:srcRect l="4697" t="20140" r="4719" b="19957"/>
+          <a:stretch/>
+        </p:blipFill>
+        <p:spPr>
+          <a:xfrm>
+            <a:off x="4432659" y="2517567"/>
+            <a:ext cx="3326682" cy="2199904"/>
+          </a:xfrm>
+          <a:prstGeom prst="rect">
+            <a:avLst/>
+          </a:prstGeom>
+        </p:spPr>
+      </p:pic>
     </p:spTree>
     <p:extLst>
       <p:ext uri="{BB962C8B-B14F-4D97-AF65-F5344CB8AC3E}">
-        <p14:creationId xmlns:p14="http://schemas.microsoft.com/office/powerpoint/2010/main" val="674693450"/>
+        <p14:creationId xmlns:p14="http://schemas.microsoft.com/office/powerpoint/2010/main" val="2937348982"/>
       </p:ext>
     </p:extLst>
   </p:cSld>
   <p:clrMapOvr>
     <a:masterClrMapping/>
   </p:clrMapOvr>
+  <p:timing>
+    <p:tnLst>
+      <p:par>
+        <p:cTn id="1" dur="indefinite" restart="never" nodeType="tmRoot">
+          <p:childTnLst>
+            <p:seq concurrent="1" nextAc="seek">
+              <p:cTn id="2" dur="indefinite" nodeType="mainSeq">
+                <p:childTnLst>
+                  <p:par>
+                    <p:cTn id="3" fill="hold">
+                      <p:stCondLst>
+                        <p:cond delay="indefinite"/>
+                        <p:cond evt="onBegin" delay="0">
+                          <p:tn val="2"/>
+                        </p:cond>
+                      </p:stCondLst>
+                      <p:childTnLst>
+                        <p:par>
+                          <p:cTn id="4" fill="hold">
+                            <p:stCondLst>
+                              <p:cond delay="0"/>
+                            </p:stCondLst>
+                            <p:childTnLst>
+                              <p:par>
+                                <p:cTn id="5" presetID="1" presetClass="exit" presetSubtype="0" fill="hold" nodeType="afterEffect">
+                                  <p:stCondLst>
+                                    <p:cond delay="700"/>
+                                  </p:stCondLst>
+                                  <p:childTnLst>
+                                    <p:set>
+                                      <p:cBhvr>
+                                        <p:cTn id="6" dur="1" fill="hold">
+                                          <p:stCondLst>
+                                            <p:cond delay="0"/>
+                                          </p:stCondLst>
+                                        </p:cTn>
+                                        <p:tgtEl>
+                                          <p:spTgt spid="7"/>
+                                        </p:tgtEl>
+                                        <p:attrNameLst>
+                                          <p:attrName>style.visibility</p:attrName>
+                                        </p:attrNameLst>
+                                      </p:cBhvr>
+                                      <p:to>
+                                        <p:strVal val="hidden"/>
+                                      </p:to>
+                                    </p:set>
+                                  </p:childTnLst>
+                                </p:cTn>
+                              </p:par>
+                            </p:childTnLst>
+                          </p:cTn>
+                        </p:par>
+                      </p:childTnLst>
+                    </p:cTn>
+                  </p:par>
+                </p:childTnLst>
+              </p:cTn>
+              <p:prevCondLst>
+                <p:cond evt="onPrev" delay="0">
+                  <p:tgtEl>
+                    <p:sldTgt/>
+                  </p:tgtEl>
+                </p:cond>
+              </p:prevCondLst>
+              <p:nextCondLst>
+                <p:cond evt="onNext" delay="0">
+                  <p:tgtEl>
+                    <p:sldTgt/>
+                  </p:tgtEl>
+                </p:cond>
+              </p:nextCondLst>
+            </p:seq>
+          </p:childTnLst>
+        </p:cTn>
+      </p:par>
+    </p:tnLst>
+  </p:timing>
+</p:sld>
+</file>
+
+<file path=ppt/slides/slide8.xml><?xml version="1.0" encoding="utf-8"?>
+<p:sld xmlns:a="http://schemas.openxmlformats.org/drawingml/2006/main" xmlns:r="http://schemas.openxmlformats.org/officeDocument/2006/relationships" xmlns:p="http://schemas.openxmlformats.org/presentationml/2006/main">
+  <p:cSld>
+    <p:spTree>
+      <p:nvGrpSpPr>
+        <p:cNvPr id="1" name=""/>
+        <p:cNvGrpSpPr/>
+        <p:nvPr/>
+      </p:nvGrpSpPr>
+      <p:grpSpPr>
+        <a:xfrm>
+          <a:off x="0" y="0"/>
+          <a:ext cx="0" cy="0"/>
+          <a:chOff x="0" y="0"/>
+          <a:chExt cx="0" cy="0"/>
+        </a:xfrm>
+      </p:grpSpPr>
+      <p:pic>
+        <p:nvPicPr>
+          <p:cNvPr id="18" name="Picture 17" descr="A picture containing text&#10;&#10;Description automatically generated">
+            <a:extLst>
+              <a:ext uri="{FF2B5EF4-FFF2-40B4-BE49-F238E27FC236}">
+                <a16:creationId xmlns:a16="http://schemas.microsoft.com/office/drawing/2014/main" id="{94578D29-70AC-C948-BA7F-69991F353187}"/>
+              </a:ext>
+            </a:extLst>
+          </p:cNvPr>
+          <p:cNvPicPr>
+            <a:picLocks noChangeAspect="1"/>
+          </p:cNvPicPr>
+          <p:nvPr/>
+        </p:nvPicPr>
+        <p:blipFill rotWithShape="1">
+          <a:blip r:embed="rId2"/>
+          <a:srcRect l="4697" t="20140" r="4719" b="19957"/>
+          <a:stretch/>
+        </p:blipFill>
+        <p:spPr>
+          <a:xfrm>
+            <a:off x="340355" y="2517568"/>
+            <a:ext cx="3326681" cy="2199903"/>
+          </a:xfrm>
+          <a:prstGeom prst="rect">
+            <a:avLst/>
+          </a:prstGeom>
+        </p:spPr>
+      </p:pic>
+      <p:pic>
+        <p:nvPicPr>
+          <p:cNvPr id="30" name="Picture 29" descr="A picture containing text&#10;&#10;Description automatically generated">
+            <a:extLst>
+              <a:ext uri="{FF2B5EF4-FFF2-40B4-BE49-F238E27FC236}">
+                <a16:creationId xmlns:a16="http://schemas.microsoft.com/office/drawing/2014/main" id="{9845375B-239E-4749-8BD5-654F6B6B4EF4}"/>
+              </a:ext>
+            </a:extLst>
+          </p:cNvPr>
+          <p:cNvPicPr>
+            <a:picLocks noChangeAspect="1"/>
+          </p:cNvPicPr>
+          <p:nvPr/>
+        </p:nvPicPr>
+        <p:blipFill rotWithShape="1">
+          <a:blip r:embed="rId2">
+            <a:duotone>
+              <a:schemeClr val="accent4">
+                <a:shade val="45000"/>
+                <a:satMod val="135000"/>
+              </a:schemeClr>
+              <a:prstClr val="white"/>
+            </a:duotone>
+          </a:blip>
+          <a:srcRect l="4697" t="20140" r="4719" b="19957"/>
+          <a:stretch/>
+        </p:blipFill>
+        <p:spPr>
+          <a:xfrm>
+            <a:off x="8524966" y="2517567"/>
+            <a:ext cx="3326682" cy="2199904"/>
+          </a:xfrm>
+          <a:prstGeom prst="rect">
+            <a:avLst/>
+          </a:prstGeom>
+        </p:spPr>
+      </p:pic>
+      <p:pic>
+        <p:nvPicPr>
+          <p:cNvPr id="6" name="Picture 5" descr="A picture containing text&#10;&#10;Description automatically generated">
+            <a:extLst>
+              <a:ext uri="{FF2B5EF4-FFF2-40B4-BE49-F238E27FC236}">
+                <a16:creationId xmlns:a16="http://schemas.microsoft.com/office/drawing/2014/main" id="{41569761-AEA6-7D44-BED4-C9349FFA1D6C}"/>
+              </a:ext>
+            </a:extLst>
+          </p:cNvPr>
+          <p:cNvPicPr>
+            <a:picLocks noChangeAspect="1"/>
+          </p:cNvPicPr>
+          <p:nvPr/>
+        </p:nvPicPr>
+        <p:blipFill rotWithShape="1">
+          <a:blip r:embed="rId2"/>
+          <a:srcRect l="4697" t="20140" r="4719" b="19957"/>
+          <a:stretch/>
+        </p:blipFill>
+        <p:spPr>
+          <a:xfrm>
+            <a:off x="4432660" y="2517568"/>
+            <a:ext cx="3326681" cy="2199903"/>
+          </a:xfrm>
+          <a:prstGeom prst="rect">
+            <a:avLst/>
+          </a:prstGeom>
+        </p:spPr>
+      </p:pic>
+    </p:spTree>
+    <p:extLst>
+      <p:ext uri="{BB962C8B-B14F-4D97-AF65-F5344CB8AC3E}">
+        <p14:creationId xmlns:p14="http://schemas.microsoft.com/office/powerpoint/2010/main" val="2557746395"/>
+      </p:ext>
+    </p:extLst>
+  </p:cSld>
+  <p:clrMapOvr>
+    <a:masterClrMapping/>
+  </p:clrMapOvr>
+  <p:timing>
+    <p:tnLst>
+      <p:par>
+        <p:cTn id="1" dur="indefinite" restart="never" nodeType="tmRoot">
+          <p:childTnLst>
+            <p:seq concurrent="1" nextAc="seek">
+              <p:cTn id="2" dur="indefinite" nodeType="mainSeq">
+                <p:childTnLst>
+                  <p:par>
+                    <p:cTn id="3" fill="hold">
+                      <p:stCondLst>
+                        <p:cond delay="indefinite"/>
+                        <p:cond evt="onBegin" delay="0">
+                          <p:tn val="2"/>
+                        </p:cond>
+                      </p:stCondLst>
+                      <p:childTnLst>
+                        <p:par>
+                          <p:cTn id="4" fill="hold">
+                            <p:stCondLst>
+                              <p:cond delay="0"/>
+                            </p:stCondLst>
+                            <p:childTnLst>
+                              <p:par>
+                                <p:cTn id="5" presetID="1" presetClass="exit" presetSubtype="0" fill="hold" nodeType="afterEffect">
+                                  <p:stCondLst>
+                                    <p:cond delay="700"/>
+                                  </p:stCondLst>
+                                  <p:childTnLst>
+                                    <p:set>
+                                      <p:cBhvr>
+                                        <p:cTn id="6" dur="1" fill="hold">
+                                          <p:stCondLst>
+                                            <p:cond delay="0"/>
+                                          </p:stCondLst>
+                                        </p:cTn>
+                                        <p:tgtEl>
+                                          <p:spTgt spid="30"/>
+                                        </p:tgtEl>
+                                        <p:attrNameLst>
+                                          <p:attrName>style.visibility</p:attrName>
+                                        </p:attrNameLst>
+                                      </p:cBhvr>
+                                      <p:to>
+                                        <p:strVal val="hidden"/>
+                                      </p:to>
+                                    </p:set>
+                                  </p:childTnLst>
+                                </p:cTn>
+                              </p:par>
+                            </p:childTnLst>
+                          </p:cTn>
+                        </p:par>
+                      </p:childTnLst>
+                    </p:cTn>
+                  </p:par>
+                </p:childTnLst>
+              </p:cTn>
+              <p:prevCondLst>
+                <p:cond evt="onPrev" delay="0">
+                  <p:tgtEl>
+                    <p:sldTgt/>
+                  </p:tgtEl>
+                </p:cond>
+              </p:prevCondLst>
+              <p:nextCondLst>
+                <p:cond evt="onNext" delay="0">
+                  <p:tgtEl>
+                    <p:sldTgt/>
+                  </p:tgtEl>
+                </p:cond>
+              </p:nextCondLst>
+            </p:seq>
+          </p:childTnLst>
+        </p:cTn>
+      </p:par>
+    </p:tnLst>
+  </p:timing>
+</p:sld>
+</file>
+
+<file path=ppt/slides/slide9.xml><?xml version="1.0" encoding="utf-8"?>
+<p:sld xmlns:a="http://schemas.openxmlformats.org/drawingml/2006/main" xmlns:r="http://schemas.openxmlformats.org/officeDocument/2006/relationships" xmlns:p="http://schemas.openxmlformats.org/presentationml/2006/main">
+  <p:cSld>
+    <p:spTree>
+      <p:nvGrpSpPr>
+        <p:cNvPr id="1" name=""/>
+        <p:cNvGrpSpPr/>
+        <p:nvPr/>
+      </p:nvGrpSpPr>
+      <p:grpSpPr>
+        <a:xfrm>
+          <a:off x="0" y="0"/>
+          <a:ext cx="0" cy="0"/>
+          <a:chOff x="0" y="0"/>
+          <a:chExt cx="0" cy="0"/>
+        </a:xfrm>
+      </p:grpSpPr>
+      <p:pic>
+        <p:nvPicPr>
+          <p:cNvPr id="18" name="Picture 17" descr="A picture containing text&#10;&#10;Description automatically generated">
+            <a:extLst>
+              <a:ext uri="{FF2B5EF4-FFF2-40B4-BE49-F238E27FC236}">
+                <a16:creationId xmlns:a16="http://schemas.microsoft.com/office/drawing/2014/main" id="{94578D29-70AC-C948-BA7F-69991F353187}"/>
+              </a:ext>
+            </a:extLst>
+          </p:cNvPr>
+          <p:cNvPicPr>
+            <a:picLocks noChangeAspect="1"/>
+          </p:cNvPicPr>
+          <p:nvPr/>
+        </p:nvPicPr>
+        <p:blipFill rotWithShape="1">
+          <a:blip r:embed="rId2"/>
+          <a:srcRect l="4697" t="20140" r="4719" b="19957"/>
+          <a:stretch/>
+        </p:blipFill>
+        <p:spPr>
+          <a:xfrm>
+            <a:off x="4432659" y="2517565"/>
+            <a:ext cx="3326681" cy="2199903"/>
+          </a:xfrm>
+          <a:prstGeom prst="rect">
+            <a:avLst/>
+          </a:prstGeom>
+        </p:spPr>
+      </p:pic>
+      <p:pic>
+        <p:nvPicPr>
+          <p:cNvPr id="6" name="Picture 5" descr="A picture containing text&#10;&#10;Description automatically generated">
+            <a:extLst>
+              <a:ext uri="{FF2B5EF4-FFF2-40B4-BE49-F238E27FC236}">
+                <a16:creationId xmlns:a16="http://schemas.microsoft.com/office/drawing/2014/main" id="{41569761-AEA6-7D44-BED4-C9349FFA1D6C}"/>
+              </a:ext>
+            </a:extLst>
+          </p:cNvPr>
+          <p:cNvPicPr>
+            <a:picLocks noChangeAspect="1"/>
+          </p:cNvPicPr>
+          <p:nvPr/>
+        </p:nvPicPr>
+        <p:blipFill rotWithShape="1">
+          <a:blip r:embed="rId2"/>
+          <a:srcRect l="4697" t="20140" r="4719" b="19957"/>
+          <a:stretch/>
+        </p:blipFill>
+        <p:spPr>
+          <a:xfrm>
+            <a:off x="8524962" y="2517565"/>
+            <a:ext cx="3326681" cy="2199903"/>
+          </a:xfrm>
+          <a:prstGeom prst="rect">
+            <a:avLst/>
+          </a:prstGeom>
+        </p:spPr>
+      </p:pic>
+      <p:pic>
+        <p:nvPicPr>
+          <p:cNvPr id="13" name="Picture 12" descr="A picture containing text&#10;&#10;Description automatically generated">
+            <a:extLst>
+              <a:ext uri="{FF2B5EF4-FFF2-40B4-BE49-F238E27FC236}">
+                <a16:creationId xmlns:a16="http://schemas.microsoft.com/office/drawing/2014/main" id="{EABC9385-C1F7-964D-BA69-0D4C18CD2695}"/>
+              </a:ext>
+            </a:extLst>
+          </p:cNvPr>
+          <p:cNvPicPr>
+            <a:picLocks noChangeAspect="1"/>
+          </p:cNvPicPr>
+          <p:nvPr/>
+        </p:nvPicPr>
+        <p:blipFill rotWithShape="1">
+          <a:blip r:embed="rId2">
+            <a:duotone>
+              <a:schemeClr val="accent4">
+                <a:shade val="45000"/>
+                <a:satMod val="135000"/>
+              </a:schemeClr>
+              <a:prstClr val="white"/>
+            </a:duotone>
+          </a:blip>
+          <a:srcRect l="4697" t="20140" r="4719" b="19957"/>
+          <a:stretch/>
+        </p:blipFill>
+        <p:spPr>
+          <a:xfrm>
+            <a:off x="340355" y="2517566"/>
+            <a:ext cx="3326682" cy="2199904"/>
+          </a:xfrm>
+          <a:prstGeom prst="rect">
+            <a:avLst/>
+          </a:prstGeom>
+        </p:spPr>
+      </p:pic>
+      <p:pic>
+        <p:nvPicPr>
+          <p:cNvPr id="5" name="Picture 4" descr="A picture containing text&#10;&#10;Description automatically generated">
+            <a:extLst>
+              <a:ext uri="{FF2B5EF4-FFF2-40B4-BE49-F238E27FC236}">
+                <a16:creationId xmlns:a16="http://schemas.microsoft.com/office/drawing/2014/main" id="{22877ADB-657F-D54B-9BE7-3E76682ADCC3}"/>
+              </a:ext>
+            </a:extLst>
+          </p:cNvPr>
+          <p:cNvPicPr>
+            <a:picLocks noChangeAspect="1"/>
+          </p:cNvPicPr>
+          <p:nvPr/>
+        </p:nvPicPr>
+        <p:blipFill rotWithShape="1">
+          <a:blip r:embed="rId2"/>
+          <a:srcRect l="4697" t="20140" r="4719" b="19957"/>
+          <a:stretch/>
+        </p:blipFill>
+        <p:spPr>
+          <a:xfrm>
+            <a:off x="340355" y="2517564"/>
+            <a:ext cx="3326681" cy="2199903"/>
+          </a:xfrm>
+          <a:prstGeom prst="rect">
+            <a:avLst/>
+          </a:prstGeom>
+        </p:spPr>
+      </p:pic>
+    </p:spTree>
+    <p:extLst>
+      <p:ext uri="{BB962C8B-B14F-4D97-AF65-F5344CB8AC3E}">
+        <p14:creationId xmlns:p14="http://schemas.microsoft.com/office/powerpoint/2010/main" val="3374066461"/>
+      </p:ext>
+    </p:extLst>
+  </p:cSld>
+  <p:clrMapOvr>
+    <a:masterClrMapping/>
+  </p:clrMapOvr>
+  <p:timing>
+    <p:tnLst>
+      <p:par>
+        <p:cTn id="1" dur="indefinite" restart="never" nodeType="tmRoot">
+          <p:childTnLst>
+            <p:seq concurrent="1" nextAc="seek">
+              <p:cTn id="2" dur="indefinite" nodeType="mainSeq">
+                <p:childTnLst>
+                  <p:par>
+                    <p:cTn id="3" fill="hold">
+                      <p:stCondLst>
+                        <p:cond delay="indefinite"/>
+                      </p:stCondLst>
+                      <p:childTnLst>
+                        <p:par>
+                          <p:cTn id="4" fill="hold">
+                            <p:stCondLst>
+                              <p:cond delay="0"/>
+                            </p:stCondLst>
+                            <p:childTnLst>
+                              <p:par>
+                                <p:cTn id="5" presetID="1" presetClass="exit" presetSubtype="0" fill="hold" nodeType="clickEffect">
+                                  <p:stCondLst>
+                                    <p:cond delay="0"/>
+                                  </p:stCondLst>
+                                  <p:childTnLst>
+                                    <p:set>
+                                      <p:cBhvr>
+                                        <p:cTn id="6" dur="1" fill="hold">
+                                          <p:stCondLst>
+                                            <p:cond delay="0"/>
+                                          </p:stCondLst>
+                                        </p:cTn>
+                                        <p:tgtEl>
+                                          <p:spTgt spid="5"/>
+                                        </p:tgtEl>
+                                        <p:attrNameLst>
+                                          <p:attrName>style.visibility</p:attrName>
+                                        </p:attrNameLst>
+                                      </p:cBhvr>
+                                      <p:to>
+                                        <p:strVal val="hidden"/>
+                                      </p:to>
+                                    </p:set>
+                                  </p:childTnLst>
+                                </p:cTn>
+                              </p:par>
+                            </p:childTnLst>
+                          </p:cTn>
+                        </p:par>
+                      </p:childTnLst>
+                    </p:cTn>
+                  </p:par>
+                  <p:par>
+                    <p:cTn id="7" fill="hold">
+                      <p:stCondLst>
+                        <p:cond delay="indefinite"/>
+                      </p:stCondLst>
+                      <p:childTnLst>
+                        <p:par>
+                          <p:cTn id="8" fill="hold">
+                            <p:stCondLst>
+                              <p:cond delay="0"/>
+                            </p:stCondLst>
+                            <p:childTnLst>
+                              <p:par>
+                                <p:cTn id="9" presetID="1" presetClass="exit" presetSubtype="0" fill="hold" nodeType="clickEffect">
+                                  <p:stCondLst>
+                                    <p:cond delay="0"/>
+                                  </p:stCondLst>
+                                  <p:childTnLst>
+                                    <p:set>
+                                      <p:cBhvr>
+                                        <p:cTn id="10" dur="1" fill="hold">
+                                          <p:stCondLst>
+                                            <p:cond delay="0"/>
+                                          </p:stCondLst>
+                                        </p:cTn>
+                                        <p:tgtEl>
+                                          <p:spTgt spid="13"/>
+                                        </p:tgtEl>
+                                        <p:attrNameLst>
+                                          <p:attrName>style.visibility</p:attrName>
+                                        </p:attrNameLst>
+                                      </p:cBhvr>
+                                      <p:to>
+                                        <p:strVal val="hidden"/>
+                                      </p:to>
+                                    </p:set>
+                                  </p:childTnLst>
+                                </p:cTn>
+                              </p:par>
+                            </p:childTnLst>
+                          </p:cTn>
+                        </p:par>
+                      </p:childTnLst>
+                    </p:cTn>
+                  </p:par>
+                </p:childTnLst>
+              </p:cTn>
+              <p:prevCondLst>
+                <p:cond evt="onPrev" delay="0">
+                  <p:tgtEl>
+                    <p:sldTgt/>
+                  </p:tgtEl>
+                </p:cond>
+              </p:prevCondLst>
+              <p:nextCondLst>
+                <p:cond evt="onNext" delay="0">
+                  <p:tgtEl>
+                    <p:sldTgt/>
+                  </p:tgtEl>
+                </p:cond>
+              </p:nextCondLst>
+            </p:seq>
+          </p:childTnLst>
+        </p:cTn>
+      </p:par>
+    </p:tnLst>
+  </p:timing>
 </p:sld>
 </file>
 

</xml_diff>

<commit_message>
some progress on baby code
</commit_message>
<xml_diff>
--- a/baby-experiment/design/design_main.pptx
+++ b/baby-experiment/design/design_main.pptx
@@ -117,6 +117,11 @@
       </a:defRPr>
     </a:lvl9pPr>
   </p:defaultTextStyle>
+  <p:extLst>
+    <p:ext uri="{EFAFB233-063F-42B5-8137-9DF3F51BA10A}">
+      <p15:sldGuideLst xmlns:p15="http://schemas.microsoft.com/office/powerpoint/2012/main"/>
+    </p:ext>
+  </p:extLst>
 </p:presentation>
 </file>
 
@@ -267,7 +272,7 @@
           <a:p>
             <a:fld id="{E8F8EB17-2345-364F-A89F-72CDC5411C28}" type="datetimeFigureOut">
               <a:rPr lang="en-US" smtClean="0"/>
-              <a:t>2/3/21</a:t>
+              <a:t>2/8/21</a:t>
             </a:fld>
             <a:endParaRPr lang="en-US"/>
           </a:p>
@@ -465,7 +470,7 @@
           <a:p>
             <a:fld id="{E8F8EB17-2345-364F-A89F-72CDC5411C28}" type="datetimeFigureOut">
               <a:rPr lang="en-US" smtClean="0"/>
-              <a:t>2/3/21</a:t>
+              <a:t>2/8/21</a:t>
             </a:fld>
             <a:endParaRPr lang="en-US"/>
           </a:p>
@@ -673,7 +678,7 @@
           <a:p>
             <a:fld id="{E8F8EB17-2345-364F-A89F-72CDC5411C28}" type="datetimeFigureOut">
               <a:rPr lang="en-US" smtClean="0"/>
-              <a:t>2/3/21</a:t>
+              <a:t>2/8/21</a:t>
             </a:fld>
             <a:endParaRPr lang="en-US"/>
           </a:p>
@@ -871,7 +876,7 @@
           <a:p>
             <a:fld id="{E8F8EB17-2345-364F-A89F-72CDC5411C28}" type="datetimeFigureOut">
               <a:rPr lang="en-US" smtClean="0"/>
-              <a:t>2/3/21</a:t>
+              <a:t>2/8/21</a:t>
             </a:fld>
             <a:endParaRPr lang="en-US"/>
           </a:p>
@@ -1146,7 +1151,7 @@
           <a:p>
             <a:fld id="{E8F8EB17-2345-364F-A89F-72CDC5411C28}" type="datetimeFigureOut">
               <a:rPr lang="en-US" smtClean="0"/>
-              <a:t>2/3/21</a:t>
+              <a:t>2/8/21</a:t>
             </a:fld>
             <a:endParaRPr lang="en-US"/>
           </a:p>
@@ -1411,7 +1416,7 @@
           <a:p>
             <a:fld id="{E8F8EB17-2345-364F-A89F-72CDC5411C28}" type="datetimeFigureOut">
               <a:rPr lang="en-US" smtClean="0"/>
-              <a:t>2/3/21</a:t>
+              <a:t>2/8/21</a:t>
             </a:fld>
             <a:endParaRPr lang="en-US"/>
           </a:p>
@@ -1823,7 +1828,7 @@
           <a:p>
             <a:fld id="{E8F8EB17-2345-364F-A89F-72CDC5411C28}" type="datetimeFigureOut">
               <a:rPr lang="en-US" smtClean="0"/>
-              <a:t>2/3/21</a:t>
+              <a:t>2/8/21</a:t>
             </a:fld>
             <a:endParaRPr lang="en-US"/>
           </a:p>
@@ -1964,7 +1969,7 @@
           <a:p>
             <a:fld id="{E8F8EB17-2345-364F-A89F-72CDC5411C28}" type="datetimeFigureOut">
               <a:rPr lang="en-US" smtClean="0"/>
-              <a:t>2/3/21</a:t>
+              <a:t>2/8/21</a:t>
             </a:fld>
             <a:endParaRPr lang="en-US"/>
           </a:p>
@@ -2077,7 +2082,7 @@
           <a:p>
             <a:fld id="{E8F8EB17-2345-364F-A89F-72CDC5411C28}" type="datetimeFigureOut">
               <a:rPr lang="en-US" smtClean="0"/>
-              <a:t>2/3/21</a:t>
+              <a:t>2/8/21</a:t>
             </a:fld>
             <a:endParaRPr lang="en-US"/>
           </a:p>
@@ -2388,7 +2393,7 @@
           <a:p>
             <a:fld id="{E8F8EB17-2345-364F-A89F-72CDC5411C28}" type="datetimeFigureOut">
               <a:rPr lang="en-US" smtClean="0"/>
-              <a:t>2/3/21</a:t>
+              <a:t>2/8/21</a:t>
             </a:fld>
             <a:endParaRPr lang="en-US"/>
           </a:p>
@@ -2676,7 +2681,7 @@
           <a:p>
             <a:fld id="{E8F8EB17-2345-364F-A89F-72CDC5411C28}" type="datetimeFigureOut">
               <a:rPr lang="en-US" smtClean="0"/>
-              <a:t>2/3/21</a:t>
+              <a:t>2/8/21</a:t>
             </a:fld>
             <a:endParaRPr lang="en-US"/>
           </a:p>
@@ -2917,7 +2922,7 @@
           <a:p>
             <a:fld id="{E8F8EB17-2345-364F-A89F-72CDC5411C28}" type="datetimeFigureOut">
               <a:rPr lang="en-US" smtClean="0"/>
-              <a:t>2/3/21</a:t>
+              <a:t>2/8/21</a:t>
             </a:fld>
             <a:endParaRPr lang="en-US"/>
           </a:p>
@@ -9081,7 +9086,7 @@
           <p:nvPr/>
         </p:nvPicPr>
         <p:blipFill rotWithShape="1">
-          <a:blip r:embed="rId2"/>
+          <a:blip r:embed="rId3"/>
           <a:srcRect l="4697" t="20140" r="4719" b="19957"/>
           <a:stretch/>
         </p:blipFill>
@@ -9110,7 +9115,7 @@
           <p:nvPr/>
         </p:nvPicPr>
         <p:blipFill>
-          <a:blip r:embed="rId3"/>
+          <a:blip r:embed="rId4"/>
           <a:stretch>
             <a:fillRect/>
           </a:stretch>
@@ -9140,7 +9145,7 @@
           <p:nvPr/>
         </p:nvPicPr>
         <p:blipFill rotWithShape="1">
-          <a:blip r:embed="rId2">
+          <a:blip r:embed="rId3">
             <a:duotone>
               <a:schemeClr val="accent4">
                 <a:shade val="45000"/>
@@ -9177,7 +9182,7 @@
           <p:nvPr/>
         </p:nvPicPr>
         <p:blipFill rotWithShape="1">
-          <a:blip r:embed="rId2"/>
+          <a:blip r:embed="rId3"/>
           <a:srcRect l="4697" t="20140" r="4719" b="19957"/>
           <a:stretch/>
         </p:blipFill>
@@ -9246,6 +9251,29 @@
                                       </p:to>
                                     </p:set>
                                   </p:childTnLst>
+                                  <p:subTnLst>
+                                    <p:audio>
+                                      <p:cMediaNode>
+                                        <p:cTn display="0" masterRel="sameClick">
+                                          <p:stCondLst>
+                                            <p:cond evt="begin" delay="0">
+                                              <p:tn val="5"/>
+                                            </p:cond>
+                                          </p:stCondLst>
+                                          <p:endCondLst>
+                                            <p:cond evt="onStopAudio" delay="0">
+                                              <p:tgtEl>
+                                                <p:sldTgt/>
+                                              </p:tgtEl>
+                                            </p:cond>
+                                          </p:endCondLst>
+                                        </p:cTn>
+                                        <p:tgtEl>
+                                          <p:sndTgt r:embed="rId2" name="chimes.wav"/>
+                                        </p:tgtEl>
+                                      </p:cMediaNode>
+                                    </p:audio>
+                                  </p:subTnLst>
                                 </p:cTn>
                               </p:par>
                             </p:childTnLst>

</xml_diff>